<commit_message>
Uploaded various help file related documents
Uploaded the help document,the latest HND file and associated image files
</commit_message>
<xml_diff>
--- a/UC1476_Help/workflow.pptx
+++ b/UC1476_Help/workflow.pptx
@@ -1089,11 +1089,7 @@
         <a:p>
           <a:r>
             <a:rPr lang="en-US" sz="900" dirty="0" smtClean="0"/>
-            <a:t> Prepare input datasets (Sub-set assets, </a:t>
-          </a:r>
-          <a:r>
-            <a:rPr lang="en-US" sz="900" dirty="0" smtClean="0"/>
-            <a:t>LCM, Floodplain, </a:t>
+            <a:t> Prepare input datasets (Sub-set assets, LCM, Floodplain, </a:t>
           </a:r>
           <a:r>
             <a:rPr lang="en-US" sz="900" dirty="0" err="1" smtClean="0"/>
@@ -1836,11 +1832,7 @@
           </a:r>
           <a:r>
             <a:rPr lang="en-US" sz="900" dirty="0" smtClean="0"/>
-            <a:t> to </a:t>
-          </a:r>
-          <a:r>
-            <a:rPr lang="en-US" sz="900" dirty="0" smtClean="0"/>
-            <a:t>margin, Land use intensity per partition</a:t>
+            <a:t> to margin, Land use intensity per partition</a:t>
           </a:r>
           <a:endParaRPr lang="en-US" sz="900" dirty="0"/>
         </a:p>
@@ -1932,6 +1924,190 @@
       </dgm:t>
     </dgm:pt>
     <dgm:pt modelId="{39567D74-0406-47B2-B7A5-EE3DEECCBCA0}" type="sibTrans" cxnId="{2F4FCB43-6F14-420A-AB2B-A3B9BCEADC9D}">
+      <dgm:prSet/>
+      <dgm:spPr/>
+      <dgm:t>
+        <a:bodyPr/>
+        <a:lstStyle/>
+        <a:p>
+          <a:endParaRPr lang="en-US"/>
+        </a:p>
+      </dgm:t>
+    </dgm:pt>
+    <dgm:pt modelId="{90EE368B-DF41-4BB4-B5CF-4E43F785E9C7}">
+      <dgm:prSet custT="1"/>
+      <dgm:spPr/>
+      <dgm:t>
+        <a:bodyPr/>
+        <a:lstStyle/>
+        <a:p>
+          <a:r>
+            <a:rPr lang="en-US" sz="900" b="1" dirty="0" smtClean="0"/>
+            <a:t>Compute bankside/island area of erosion/deposition</a:t>
+          </a:r>
+        </a:p>
+      </dgm:t>
+    </dgm:pt>
+    <dgm:pt modelId="{F4C44B4C-9568-4137-BB96-F7D4D609C379}" type="parTrans" cxnId="{7731F698-0ECE-4C38-A854-3C73DBFF7575}">
+      <dgm:prSet/>
+      <dgm:spPr/>
+      <dgm:t>
+        <a:bodyPr/>
+        <a:lstStyle/>
+        <a:p>
+          <a:endParaRPr lang="en-US"/>
+        </a:p>
+      </dgm:t>
+    </dgm:pt>
+    <dgm:pt modelId="{27F62D52-AF69-4BC3-8EB5-9BA6B5CA34AA}" type="sibTrans" cxnId="{7731F698-0ECE-4C38-A854-3C73DBFF7575}">
+      <dgm:prSet/>
+      <dgm:spPr/>
+      <dgm:t>
+        <a:bodyPr/>
+        <a:lstStyle/>
+        <a:p>
+          <a:endParaRPr lang="en-US"/>
+        </a:p>
+      </dgm:t>
+    </dgm:pt>
+    <dgm:pt modelId="{9451C9F1-0991-4F9A-B34C-D9183914FC00}">
+      <dgm:prSet custScaleX="207036" custT="1"/>
+      <dgm:spPr/>
+      <dgm:t>
+        <a:bodyPr/>
+        <a:lstStyle/>
+        <a:p>
+          <a:r>
+            <a:rPr lang="en-US" sz="900" b="0" dirty="0" smtClean="0"/>
+            <a:t>Run compute area of erosion/deposition based upon bank lines</a:t>
+          </a:r>
+          <a:endParaRPr lang="en-US" sz="900" dirty="0"/>
+        </a:p>
+      </dgm:t>
+    </dgm:pt>
+    <dgm:pt modelId="{7FC3342C-3888-45E0-8C41-7BFBE5C93621}" type="parTrans" cxnId="{757ACCCF-72DD-4B87-9C70-495A240D3608}">
+      <dgm:prSet/>
+      <dgm:spPr/>
+      <dgm:t>
+        <a:bodyPr/>
+        <a:lstStyle/>
+        <a:p>
+          <a:endParaRPr lang="en-US"/>
+        </a:p>
+      </dgm:t>
+    </dgm:pt>
+    <dgm:pt modelId="{A688C5F1-89F0-4125-B9C5-6619AE36F830}" type="sibTrans" cxnId="{757ACCCF-72DD-4B87-9C70-495A240D3608}">
+      <dgm:prSet/>
+      <dgm:spPr/>
+      <dgm:t>
+        <a:bodyPr/>
+        <a:lstStyle/>
+        <a:p>
+          <a:endParaRPr lang="en-US"/>
+        </a:p>
+      </dgm:t>
+    </dgm:pt>
+    <dgm:pt modelId="{2EDBA865-005C-46EA-80FF-2AFDEBF73CAF}">
+      <dgm:prSet custT="1"/>
+      <dgm:spPr/>
+      <dgm:t>
+        <a:bodyPr/>
+        <a:lstStyle/>
+        <a:p>
+          <a:r>
+            <a:rPr lang="en-US" sz="900" dirty="0" smtClean="0"/>
+            <a:t>Run compute area of erosion/deposition for island bank lines</a:t>
+          </a:r>
+          <a:endParaRPr lang="en-US" sz="900" dirty="0"/>
+        </a:p>
+      </dgm:t>
+    </dgm:pt>
+    <dgm:pt modelId="{49FA5C5B-6BA0-45E0-9A5C-03ADDC8B1517}" type="parTrans" cxnId="{2AED1AC8-8506-4AD9-8BF1-45A5DA6C8BDA}">
+      <dgm:prSet/>
+      <dgm:spPr/>
+      <dgm:t>
+        <a:bodyPr/>
+        <a:lstStyle/>
+        <a:p>
+          <a:endParaRPr lang="en-US"/>
+        </a:p>
+      </dgm:t>
+    </dgm:pt>
+    <dgm:pt modelId="{9874EF1A-6FAD-4D68-80B0-BF9FA6BEC70B}" type="sibTrans" cxnId="{2AED1AC8-8506-4AD9-8BF1-45A5DA6C8BDA}">
+      <dgm:prSet/>
+      <dgm:spPr/>
+      <dgm:t>
+        <a:bodyPr/>
+        <a:lstStyle/>
+        <a:p>
+          <a:endParaRPr lang="en-US"/>
+        </a:p>
+      </dgm:t>
+    </dgm:pt>
+    <dgm:pt modelId="{15DBC0A0-906C-473F-8D0C-89DD2EC3CDC2}">
+      <dgm:prSet custT="1"/>
+      <dgm:spPr/>
+      <dgm:t>
+        <a:bodyPr/>
+        <a:lstStyle/>
+        <a:p>
+          <a:r>
+            <a:rPr lang="en-US" sz="900" dirty="0" smtClean="0"/>
+            <a:t>Run Transfer bank data to segments</a:t>
+          </a:r>
+          <a:endParaRPr lang="en-US" sz="900" dirty="0"/>
+        </a:p>
+      </dgm:t>
+    </dgm:pt>
+    <dgm:pt modelId="{F787DCBF-07E8-4750-A3AD-252E82530C24}" type="parTrans" cxnId="{A01C1220-99F6-47E5-B9B9-74061C5C5F2E}">
+      <dgm:prSet/>
+      <dgm:spPr/>
+      <dgm:t>
+        <a:bodyPr/>
+        <a:lstStyle/>
+        <a:p>
+          <a:endParaRPr lang="en-US"/>
+        </a:p>
+      </dgm:t>
+    </dgm:pt>
+    <dgm:pt modelId="{CB0E1016-BECD-4ADF-92D8-4841E7C09CE9}" type="sibTrans" cxnId="{A01C1220-99F6-47E5-B9B9-74061C5C5F2E}">
+      <dgm:prSet/>
+      <dgm:spPr/>
+      <dgm:t>
+        <a:bodyPr/>
+        <a:lstStyle/>
+        <a:p>
+          <a:endParaRPr lang="en-US"/>
+        </a:p>
+      </dgm:t>
+    </dgm:pt>
+    <dgm:pt modelId="{6A550D35-C354-4B77-A295-7EB9ACCA6F69}">
+      <dgm:prSet custT="1"/>
+      <dgm:spPr/>
+      <dgm:t>
+        <a:bodyPr/>
+        <a:lstStyle/>
+        <a:p>
+          <a:r>
+            <a:rPr lang="en-US" sz="900" dirty="0" smtClean="0"/>
+            <a:t>Create Risk Map</a:t>
+          </a:r>
+          <a:endParaRPr lang="en-US" sz="900" dirty="0"/>
+        </a:p>
+      </dgm:t>
+    </dgm:pt>
+    <dgm:pt modelId="{A13A6E99-2943-4735-86BB-005F664FC856}" type="parTrans" cxnId="{E21B71D3-2B2E-40E6-86AE-5851BB497FA4}">
+      <dgm:prSet/>
+      <dgm:spPr/>
+      <dgm:t>
+        <a:bodyPr/>
+        <a:lstStyle/>
+        <a:p>
+          <a:endParaRPr lang="en-US"/>
+        </a:p>
+      </dgm:t>
+    </dgm:pt>
+    <dgm:pt modelId="{7AF5B463-ECCD-490D-B36A-BAABB4233DBB}" type="sibTrans" cxnId="{E21B71D3-2B2E-40E6-86AE-5851BB497FA4}">
       <dgm:prSet/>
       <dgm:spPr/>
       <dgm:t>
@@ -1958,7 +2134,7 @@
       </dgm:t>
     </dgm:pt>
     <dgm:pt modelId="{C8B4AF29-F8B2-4B5C-9A0A-4318A0FDAA67}" type="pres">
-      <dgm:prSet presAssocID="{D2A5F00B-7541-4379-8085-62CCE5822ADD}" presName="node" presStyleLbl="node1" presStyleIdx="0" presStyleCnt="6" custScaleX="206859" custScaleY="81053">
+      <dgm:prSet presAssocID="{D2A5F00B-7541-4379-8085-62CCE5822ADD}" presName="node" presStyleLbl="node1" presStyleIdx="0" presStyleCnt="7" custScaleX="206859" custScaleY="81053">
         <dgm:presLayoutVars>
           <dgm:bulletEnabled val="1"/>
         </dgm:presLayoutVars>
@@ -1973,7 +2149,7 @@
       </dgm:t>
     </dgm:pt>
     <dgm:pt modelId="{AB32203C-6605-47CB-9C1E-BA71B646A831}" type="pres">
-      <dgm:prSet presAssocID="{776B47BF-149E-4E1D-865B-398D6E023415}" presName="sibTrans" presStyleLbl="sibTrans2D1" presStyleIdx="0" presStyleCnt="5"/>
+      <dgm:prSet presAssocID="{776B47BF-149E-4E1D-865B-398D6E023415}" presName="sibTrans" presStyleLbl="sibTrans2D1" presStyleIdx="0" presStyleCnt="6"/>
       <dgm:spPr/>
       <dgm:t>
         <a:bodyPr/>
@@ -1984,7 +2160,7 @@
       </dgm:t>
     </dgm:pt>
     <dgm:pt modelId="{AEAFAB2C-C82E-445E-A509-0DB7B4BBA7C6}" type="pres">
-      <dgm:prSet presAssocID="{776B47BF-149E-4E1D-865B-398D6E023415}" presName="connectorText" presStyleLbl="sibTrans2D1" presStyleIdx="0" presStyleCnt="5"/>
+      <dgm:prSet presAssocID="{776B47BF-149E-4E1D-865B-398D6E023415}" presName="connectorText" presStyleLbl="sibTrans2D1" presStyleIdx="0" presStyleCnt="6"/>
       <dgm:spPr/>
       <dgm:t>
         <a:bodyPr/>
@@ -1995,7 +2171,7 @@
       </dgm:t>
     </dgm:pt>
     <dgm:pt modelId="{EBB63F27-B095-46AF-B7D4-749C71931F9F}" type="pres">
-      <dgm:prSet presAssocID="{290EDCBE-B534-4CA5-90C5-8364239BCE10}" presName="node" presStyleLbl="node1" presStyleIdx="1" presStyleCnt="6" custScaleX="206859" custScaleY="108155">
+      <dgm:prSet presAssocID="{290EDCBE-B534-4CA5-90C5-8364239BCE10}" presName="node" presStyleLbl="node1" presStyleIdx="1" presStyleCnt="7" custScaleX="206859" custScaleY="108155">
         <dgm:presLayoutVars>
           <dgm:bulletEnabled val="1"/>
         </dgm:presLayoutVars>
@@ -2010,7 +2186,7 @@
       </dgm:t>
     </dgm:pt>
     <dgm:pt modelId="{7D2A00C7-6363-46B9-9825-DD209EB38952}" type="pres">
-      <dgm:prSet presAssocID="{485B0A70-06BD-4D35-B668-ED58761A182E}" presName="sibTrans" presStyleLbl="sibTrans2D1" presStyleIdx="1" presStyleCnt="5"/>
+      <dgm:prSet presAssocID="{485B0A70-06BD-4D35-B668-ED58761A182E}" presName="sibTrans" presStyleLbl="sibTrans2D1" presStyleIdx="1" presStyleCnt="6"/>
       <dgm:spPr/>
       <dgm:t>
         <a:bodyPr/>
@@ -2021,7 +2197,7 @@
       </dgm:t>
     </dgm:pt>
     <dgm:pt modelId="{27943FF0-9052-42FC-9D2A-94DC53C9046A}" type="pres">
-      <dgm:prSet presAssocID="{485B0A70-06BD-4D35-B668-ED58761A182E}" presName="connectorText" presStyleLbl="sibTrans2D1" presStyleIdx="1" presStyleCnt="5"/>
+      <dgm:prSet presAssocID="{485B0A70-06BD-4D35-B668-ED58761A182E}" presName="connectorText" presStyleLbl="sibTrans2D1" presStyleIdx="1" presStyleCnt="6"/>
       <dgm:spPr/>
       <dgm:t>
         <a:bodyPr/>
@@ -2032,7 +2208,7 @@
       </dgm:t>
     </dgm:pt>
     <dgm:pt modelId="{F35FA51F-D25E-4A0E-9B7A-7980DF29C0D3}" type="pres">
-      <dgm:prSet presAssocID="{0ABFD958-B094-420D-88FF-FC720517B5FF}" presName="node" presStyleLbl="node1" presStyleIdx="2" presStyleCnt="6" custScaleX="206859" custScaleY="123225">
+      <dgm:prSet presAssocID="{0ABFD958-B094-420D-88FF-FC720517B5FF}" presName="node" presStyleLbl="node1" presStyleIdx="2" presStyleCnt="7" custScaleX="206859" custScaleY="123225">
         <dgm:presLayoutVars>
           <dgm:bulletEnabled val="1"/>
         </dgm:presLayoutVars>
@@ -2047,7 +2223,7 @@
       </dgm:t>
     </dgm:pt>
     <dgm:pt modelId="{B899CA72-4432-44BC-8D29-47203ECE9433}" type="pres">
-      <dgm:prSet presAssocID="{14EC1BFC-72BE-44AF-87BE-038F2D66781B}" presName="sibTrans" presStyleLbl="sibTrans2D1" presStyleIdx="2" presStyleCnt="5"/>
+      <dgm:prSet presAssocID="{14EC1BFC-72BE-44AF-87BE-038F2D66781B}" presName="sibTrans" presStyleLbl="sibTrans2D1" presStyleIdx="2" presStyleCnt="6"/>
       <dgm:spPr/>
       <dgm:t>
         <a:bodyPr/>
@@ -2058,7 +2234,7 @@
       </dgm:t>
     </dgm:pt>
     <dgm:pt modelId="{F6AF2990-2CBB-4D24-AA87-E1BACC8BFE89}" type="pres">
-      <dgm:prSet presAssocID="{14EC1BFC-72BE-44AF-87BE-038F2D66781B}" presName="connectorText" presStyleLbl="sibTrans2D1" presStyleIdx="2" presStyleCnt="5"/>
+      <dgm:prSet presAssocID="{14EC1BFC-72BE-44AF-87BE-038F2D66781B}" presName="connectorText" presStyleLbl="sibTrans2D1" presStyleIdx="2" presStyleCnt="6"/>
       <dgm:spPr/>
       <dgm:t>
         <a:bodyPr/>
@@ -2069,7 +2245,7 @@
       </dgm:t>
     </dgm:pt>
     <dgm:pt modelId="{F88DA77E-5075-4DFD-A626-16139537C385}" type="pres">
-      <dgm:prSet presAssocID="{16993775-A1B3-4465-9450-559FE64AD127}" presName="node" presStyleLbl="node1" presStyleIdx="3" presStyleCnt="6" custScaleX="206859" custScaleY="151995" custLinFactNeighborX="562" custLinFactNeighborY="-8991">
+      <dgm:prSet presAssocID="{16993775-A1B3-4465-9450-559FE64AD127}" presName="node" presStyleLbl="node1" presStyleIdx="3" presStyleCnt="7" custScaleX="206859" custScaleY="151995" custLinFactNeighborX="562" custLinFactNeighborY="-8991">
         <dgm:presLayoutVars>
           <dgm:bulletEnabled val="1"/>
         </dgm:presLayoutVars>
@@ -2084,7 +2260,7 @@
       </dgm:t>
     </dgm:pt>
     <dgm:pt modelId="{A55B3566-2B07-4604-AAB8-DD63E2B590AA}" type="pres">
-      <dgm:prSet presAssocID="{4518F0E6-1458-4A52-90C5-256335DE3373}" presName="sibTrans" presStyleLbl="sibTrans2D1" presStyleIdx="3" presStyleCnt="5"/>
+      <dgm:prSet presAssocID="{4518F0E6-1458-4A52-90C5-256335DE3373}" presName="sibTrans" presStyleLbl="sibTrans2D1" presStyleIdx="3" presStyleCnt="6"/>
       <dgm:spPr/>
       <dgm:t>
         <a:bodyPr/>
@@ -2095,7 +2271,7 @@
       </dgm:t>
     </dgm:pt>
     <dgm:pt modelId="{316DCBA6-B9ED-4796-B23D-A21A99D2036C}" type="pres">
-      <dgm:prSet presAssocID="{4518F0E6-1458-4A52-90C5-256335DE3373}" presName="connectorText" presStyleLbl="sibTrans2D1" presStyleIdx="3" presStyleCnt="5"/>
+      <dgm:prSet presAssocID="{4518F0E6-1458-4A52-90C5-256335DE3373}" presName="connectorText" presStyleLbl="sibTrans2D1" presStyleIdx="3" presStyleCnt="6"/>
       <dgm:spPr/>
       <dgm:t>
         <a:bodyPr/>
@@ -2106,7 +2282,7 @@
       </dgm:t>
     </dgm:pt>
     <dgm:pt modelId="{3D7F7322-53B4-41B9-9E72-0AAACD791497}" type="pres">
-      <dgm:prSet presAssocID="{49C90B1B-350C-495E-A6BA-77729B5C1025}" presName="node" presStyleLbl="node1" presStyleIdx="4" presStyleCnt="6" custScaleX="206859" custScaleY="96884">
+      <dgm:prSet presAssocID="{49C90B1B-350C-495E-A6BA-77729B5C1025}" presName="node" presStyleLbl="node1" presStyleIdx="4" presStyleCnt="7" custScaleX="206859" custScaleY="135483">
         <dgm:presLayoutVars>
           <dgm:bulletEnabled val="1"/>
         </dgm:presLayoutVars>
@@ -2121,7 +2297,7 @@
       </dgm:t>
     </dgm:pt>
     <dgm:pt modelId="{AE9CB4F5-053D-4F08-A1E7-809CD882C798}" type="pres">
-      <dgm:prSet presAssocID="{EC8623DE-B011-42CC-9804-A22FD45491AC}" presName="sibTrans" presStyleLbl="sibTrans2D1" presStyleIdx="4" presStyleCnt="5"/>
+      <dgm:prSet presAssocID="{EC8623DE-B011-42CC-9804-A22FD45491AC}" presName="sibTrans" presStyleLbl="sibTrans2D1" presStyleIdx="4" presStyleCnt="6"/>
       <dgm:spPr/>
       <dgm:t>
         <a:bodyPr/>
@@ -2132,7 +2308,7 @@
       </dgm:t>
     </dgm:pt>
     <dgm:pt modelId="{A5F5FD2B-D354-4C95-B039-8B9B252B242F}" type="pres">
-      <dgm:prSet presAssocID="{EC8623DE-B011-42CC-9804-A22FD45491AC}" presName="connectorText" presStyleLbl="sibTrans2D1" presStyleIdx="4" presStyleCnt="5"/>
+      <dgm:prSet presAssocID="{EC8623DE-B011-42CC-9804-A22FD45491AC}" presName="connectorText" presStyleLbl="sibTrans2D1" presStyleIdx="4" presStyleCnt="6"/>
       <dgm:spPr/>
       <dgm:t>
         <a:bodyPr/>
@@ -2143,7 +2319,44 @@
       </dgm:t>
     </dgm:pt>
     <dgm:pt modelId="{0623080B-F2D3-4BDD-A4AE-88ADA437E8EF}" type="pres">
-      <dgm:prSet presAssocID="{0B8005AB-D61F-456D-8C11-6F67918EA96C}" presName="node" presStyleLbl="node1" presStyleIdx="5" presStyleCnt="6" custScaleX="206859" custScaleY="66079">
+      <dgm:prSet presAssocID="{0B8005AB-D61F-456D-8C11-6F67918EA96C}" presName="node" presStyleLbl="node1" presStyleIdx="5" presStyleCnt="7" custScaleX="206859" custScaleY="66079">
+        <dgm:presLayoutVars>
+          <dgm:bulletEnabled val="1"/>
+        </dgm:presLayoutVars>
+      </dgm:prSet>
+      <dgm:spPr/>
+      <dgm:t>
+        <a:bodyPr/>
+        <a:lstStyle/>
+        <a:p>
+          <a:endParaRPr lang="en-US"/>
+        </a:p>
+      </dgm:t>
+    </dgm:pt>
+    <dgm:pt modelId="{E04BC851-4077-4081-A3BE-7625339DCA10}" type="pres">
+      <dgm:prSet presAssocID="{32CD54E3-E64B-481A-B44C-B1E26CF3D195}" presName="sibTrans" presStyleLbl="sibTrans2D1" presStyleIdx="5" presStyleCnt="6"/>
+      <dgm:spPr/>
+      <dgm:t>
+        <a:bodyPr/>
+        <a:lstStyle/>
+        <a:p>
+          <a:endParaRPr lang="en-US"/>
+        </a:p>
+      </dgm:t>
+    </dgm:pt>
+    <dgm:pt modelId="{3CBE53E0-FC52-4051-A6A8-0DD747FB7D18}" type="pres">
+      <dgm:prSet presAssocID="{32CD54E3-E64B-481A-B44C-B1E26CF3D195}" presName="connectorText" presStyleLbl="sibTrans2D1" presStyleIdx="5" presStyleCnt="6"/>
+      <dgm:spPr/>
+      <dgm:t>
+        <a:bodyPr/>
+        <a:lstStyle/>
+        <a:p>
+          <a:endParaRPr lang="en-US"/>
+        </a:p>
+      </dgm:t>
+    </dgm:pt>
+    <dgm:pt modelId="{D2E47E72-15F6-4EFC-A61F-8766144EE0D8}" type="pres">
+      <dgm:prSet presAssocID="{90EE368B-DF41-4BB4-B5CF-4E43F785E9C7}" presName="node" presStyleLbl="node1" presStyleIdx="6" presStyleCnt="7" custScaleX="207036" custScaleY="128346">
         <dgm:presLayoutVars>
           <dgm:bulletEnabled val="1"/>
         </dgm:presLayoutVars>
@@ -2184,10 +2397,14 @@
     <dgm:cxn modelId="{20B1EF23-B5D3-4071-A130-38BE9C9C9F12}" type="presOf" srcId="{078E7D13-27B0-4F7A-ABBD-4BD631A7688D}" destId="{0623080B-F2D3-4BDD-A4AE-88ADA437E8EF}" srcOrd="0" destOrd="2" presId="urn:microsoft.com/office/officeart/2005/8/layout/process2"/>
     <dgm:cxn modelId="{6B3B0046-B0B9-4AE8-8406-CAD2ED01B167}" type="presOf" srcId="{E470F5E8-8EE4-42A4-AFBD-48C94E828076}" destId="{F35FA51F-D25E-4A0E-9B7A-7980DF29C0D3}" srcOrd="0" destOrd="2" presId="urn:microsoft.com/office/officeart/2005/8/layout/process2"/>
     <dgm:cxn modelId="{606D8FBD-8713-4791-A763-BFAA438C2098}" srcId="{0ABFD958-B094-420D-88FF-FC720517B5FF}" destId="{67E6083B-381A-4F87-9C92-962DEFE065B8}" srcOrd="0" destOrd="0" parTransId="{38FF50D2-E850-4E70-A2D1-B1BFA2A96C9C}" sibTransId="{A5DA82AA-4005-499E-9B05-5F043383C8B6}"/>
+    <dgm:cxn modelId="{E21B71D3-2B2E-40E6-86AE-5851BB497FA4}" srcId="{90EE368B-DF41-4BB4-B5CF-4E43F785E9C7}" destId="{6A550D35-C354-4B77-A295-7EB9ACCA6F69}" srcOrd="3" destOrd="0" parTransId="{A13A6E99-2943-4735-86BB-005F664FC856}" sibTransId="{7AF5B463-ECCD-490D-B36A-BAABB4233DBB}"/>
     <dgm:cxn modelId="{1E6C53D6-1B98-496C-9189-D02B506E96AC}" srcId="{F3DCAD5A-F45F-4C6F-B940-AC659851C98C}" destId="{D2A5F00B-7541-4379-8085-62CCE5822ADD}" srcOrd="0" destOrd="0" parTransId="{22791ED0-7158-4DDF-A7FF-EB7034F95F6A}" sibTransId="{776B47BF-149E-4E1D-865B-398D6E023415}"/>
     <dgm:cxn modelId="{5BF8AE7C-1A91-42B5-9D13-BB36C1FC3DD3}" srcId="{0B8005AB-D61F-456D-8C11-6F67918EA96C}" destId="{E99DED21-0E10-4A21-A6F1-81D30C61487B}" srcOrd="0" destOrd="0" parTransId="{E74588BB-17F4-4935-9AF0-59B046186DBE}" sibTransId="{CF0EA60F-1F90-422D-B2F9-43FD66289F4C}"/>
+    <dgm:cxn modelId="{757ACCCF-72DD-4B87-9C70-495A240D3608}" srcId="{90EE368B-DF41-4BB4-B5CF-4E43F785E9C7}" destId="{9451C9F1-0991-4F9A-B34C-D9183914FC00}" srcOrd="0" destOrd="0" parTransId="{7FC3342C-3888-45E0-8C41-7BFBE5C93621}" sibTransId="{A688C5F1-89F0-4125-B9C5-6619AE36F830}"/>
+    <dgm:cxn modelId="{245194E6-4725-4061-AF41-009E9791B882}" type="presOf" srcId="{90EE368B-DF41-4BB4-B5CF-4E43F785E9C7}" destId="{D2E47E72-15F6-4EFC-A61F-8766144EE0D8}" srcOrd="0" destOrd="0" presId="urn:microsoft.com/office/officeart/2005/8/layout/process2"/>
     <dgm:cxn modelId="{7280C356-4205-47EC-A7D2-65EE3789C9E2}" srcId="{0ABFD958-B094-420D-88FF-FC720517B5FF}" destId="{ECD95D4A-13DA-4E15-B9CA-10A97F45746B}" srcOrd="2" destOrd="0" parTransId="{855CED17-6F22-46A7-8354-4500E628382C}" sibTransId="{1A514E8E-5B87-439E-AAF7-68D1E6FD7471}"/>
     <dgm:cxn modelId="{8783044B-E7FC-4C2C-A624-946DEEF598C4}" srcId="{16993775-A1B3-4465-9450-559FE64AD127}" destId="{6B88644D-3962-4E9E-8765-C158036A6317}" srcOrd="1" destOrd="0" parTransId="{C8F92A58-0373-4375-B774-64E6C3225B39}" sibTransId="{E04F5FB8-48FF-43B7-B989-943D8AE0A78C}"/>
+    <dgm:cxn modelId="{B259C185-DB8C-4B61-B075-2D773F43A41A}" type="presOf" srcId="{9451C9F1-0991-4F9A-B34C-D9183914FC00}" destId="{D2E47E72-15F6-4EFC-A61F-8766144EE0D8}" srcOrd="0" destOrd="1" presId="urn:microsoft.com/office/officeart/2005/8/layout/process2"/>
     <dgm:cxn modelId="{20E4698B-BB2C-4FC1-9657-5CA1999180BF}" type="presOf" srcId="{0B8005AB-D61F-456D-8C11-6F67918EA96C}" destId="{0623080B-F2D3-4BDD-A4AE-88ADA437E8EF}" srcOrd="0" destOrd="0" presId="urn:microsoft.com/office/officeart/2005/8/layout/process2"/>
     <dgm:cxn modelId="{12565BA9-438F-42F6-9870-5CC847BD17CF}" type="presOf" srcId="{ECD95D4A-13DA-4E15-B9CA-10A97F45746B}" destId="{F35FA51F-D25E-4A0E-9B7A-7980DF29C0D3}" srcOrd="0" destOrd="3" presId="urn:microsoft.com/office/officeart/2005/8/layout/process2"/>
     <dgm:cxn modelId="{37EAA455-770F-4BA4-8AD6-6DB2EE626D4B}" srcId="{F3DCAD5A-F45F-4C6F-B940-AC659851C98C}" destId="{16993775-A1B3-4465-9450-559FE64AD127}" srcOrd="3" destOrd="0" parTransId="{4B4048F1-85CF-4E65-A434-84D361384354}" sibTransId="{4518F0E6-1458-4A52-90C5-256335DE3373}"/>
@@ -2195,17 +2412,22 @@
     <dgm:cxn modelId="{F8595CE8-6038-4BB8-9B2C-DD5941EA0F5C}" type="presOf" srcId="{F3DCAD5A-F45F-4C6F-B940-AC659851C98C}" destId="{69A4926D-2EDD-467E-AF23-E402B22BF067}" srcOrd="0" destOrd="0" presId="urn:microsoft.com/office/officeart/2005/8/layout/process2"/>
     <dgm:cxn modelId="{A2CACF9E-E36A-4AAE-9AF7-E1A6C45E4263}" type="presOf" srcId="{67E6083B-381A-4F87-9C92-962DEFE065B8}" destId="{F35FA51F-D25E-4A0E-9B7A-7980DF29C0D3}" srcOrd="0" destOrd="1" presId="urn:microsoft.com/office/officeart/2005/8/layout/process2"/>
     <dgm:cxn modelId="{490C2364-24B9-45B7-8D1E-267AF60BC5E3}" srcId="{F3DCAD5A-F45F-4C6F-B940-AC659851C98C}" destId="{0B8005AB-D61F-456D-8C11-6F67918EA96C}" srcOrd="5" destOrd="0" parTransId="{4951168C-6818-4F26-9A98-642725D11B57}" sibTransId="{32CD54E3-E64B-481A-B44C-B1E26CF3D195}"/>
+    <dgm:cxn modelId="{2AED1AC8-8506-4AD9-8BF1-45A5DA6C8BDA}" srcId="{90EE368B-DF41-4BB4-B5CF-4E43F785E9C7}" destId="{2EDBA865-005C-46EA-80FF-2AFDEBF73CAF}" srcOrd="1" destOrd="0" parTransId="{49FA5C5B-6BA0-45E0-9A5C-03ADDC8B1517}" sibTransId="{9874EF1A-6FAD-4D68-80B0-BF9FA6BEC70B}"/>
+    <dgm:cxn modelId="{563F340F-D65E-4D0A-B6BB-B191C1DCC5A5}" type="presOf" srcId="{15DBC0A0-906C-473F-8D0C-89DD2EC3CDC2}" destId="{D2E47E72-15F6-4EFC-A61F-8766144EE0D8}" srcOrd="0" destOrd="3" presId="urn:microsoft.com/office/officeart/2005/8/layout/process2"/>
     <dgm:cxn modelId="{F23F14A7-E1B0-4B5C-A92E-929BB4E54776}" type="presOf" srcId="{00D209B5-B1C9-4010-8227-5FA4495FD1BC}" destId="{EBB63F27-B095-46AF-B7D4-749C71931F9F}" srcOrd="0" destOrd="1" presId="urn:microsoft.com/office/officeart/2005/8/layout/process2"/>
     <dgm:cxn modelId="{37C529E2-4999-4360-A7B5-AB927F83D5EF}" srcId="{0ABFD958-B094-420D-88FF-FC720517B5FF}" destId="{E470F5E8-8EE4-42A4-AFBD-48C94E828076}" srcOrd="1" destOrd="0" parTransId="{8D83B3E8-396B-4BF9-9C72-7FA9F528E740}" sibTransId="{DA55CE98-C142-42B4-867E-BD2ACCF632D5}"/>
+    <dgm:cxn modelId="{E36D3E61-7AF5-42CA-8DBA-F5D644FC014A}" type="presOf" srcId="{32CD54E3-E64B-481A-B44C-B1E26CF3D195}" destId="{3CBE53E0-FC52-4051-A6A8-0DD747FB7D18}" srcOrd="1" destOrd="0" presId="urn:microsoft.com/office/officeart/2005/8/layout/process2"/>
     <dgm:cxn modelId="{A8FE3D7D-DF46-47C5-8B5E-7539D76A5FC0}" srcId="{F3DCAD5A-F45F-4C6F-B940-AC659851C98C}" destId="{0ABFD958-B094-420D-88FF-FC720517B5FF}" srcOrd="2" destOrd="0" parTransId="{0C7B77FD-5607-4402-B11D-32DA7AB6B049}" sibTransId="{14EC1BFC-72BE-44AF-87BE-038F2D66781B}"/>
     <dgm:cxn modelId="{1A49F522-34BC-4A74-ACD7-B3A422DA33DB}" srcId="{D2A5F00B-7541-4379-8085-62CCE5822ADD}" destId="{62907C3C-0D05-4832-B250-C5A1C8B8BB09}" srcOrd="0" destOrd="0" parTransId="{B02D94F0-7DBA-4CAC-A6BC-8195AE3ED0AE}" sibTransId="{412AC000-FBBE-4737-8703-06A926F32925}"/>
     <dgm:cxn modelId="{DD6F9529-F3AB-4D88-9BEE-27DFCC0FDDEC}" srcId="{F3DCAD5A-F45F-4C6F-B940-AC659851C98C}" destId="{290EDCBE-B534-4CA5-90C5-8364239BCE10}" srcOrd="1" destOrd="0" parTransId="{7EFE1CD0-8FE0-4A82-AFFE-7B6A35443291}" sibTransId="{485B0A70-06BD-4D35-B668-ED58761A182E}"/>
     <dgm:cxn modelId="{A981D05F-6FE5-403E-9C86-7CAB73E4D6AF}" type="presOf" srcId="{E99DED21-0E10-4A21-A6F1-81D30C61487B}" destId="{0623080B-F2D3-4BDD-A4AE-88ADA437E8EF}" srcOrd="0" destOrd="1" presId="urn:microsoft.com/office/officeart/2005/8/layout/process2"/>
+    <dgm:cxn modelId="{7731F698-0ECE-4C38-A854-3C73DBFF7575}" srcId="{F3DCAD5A-F45F-4C6F-B940-AC659851C98C}" destId="{90EE368B-DF41-4BB4-B5CF-4E43F785E9C7}" srcOrd="6" destOrd="0" parTransId="{F4C44B4C-9568-4137-BB96-F7D4D609C379}" sibTransId="{27F62D52-AF69-4BC3-8EB5-9BA6B5CA34AA}"/>
     <dgm:cxn modelId="{D27266D1-474C-4496-91B5-D6B51A887736}" type="presOf" srcId="{290EDCBE-B534-4CA5-90C5-8364239BCE10}" destId="{EBB63F27-B095-46AF-B7D4-749C71931F9F}" srcOrd="0" destOrd="0" presId="urn:microsoft.com/office/officeart/2005/8/layout/process2"/>
     <dgm:cxn modelId="{2E71EADE-9D8D-4781-A7E5-7352E9A4FB66}" type="presOf" srcId="{10ACB5D6-FB1B-459C-8135-D22AB1DB661E}" destId="{F88DA77E-5075-4DFD-A626-16139537C385}" srcOrd="0" destOrd="1" presId="urn:microsoft.com/office/officeart/2005/8/layout/process2"/>
     <dgm:cxn modelId="{21463B01-FE42-42A8-856E-86A78E1369A4}" type="presOf" srcId="{776B47BF-149E-4E1D-865B-398D6E023415}" destId="{AB32203C-6605-47CB-9C1E-BA71B646A831}" srcOrd="0" destOrd="0" presId="urn:microsoft.com/office/officeart/2005/8/layout/process2"/>
     <dgm:cxn modelId="{929C629A-996F-4D93-9EFE-E62D0C079A1E}" type="presOf" srcId="{8C04B313-8C56-43AF-B909-BE6A3ABF10A3}" destId="{EBB63F27-B095-46AF-B7D4-749C71931F9F}" srcOrd="0" destOrd="3" presId="urn:microsoft.com/office/officeart/2005/8/layout/process2"/>
     <dgm:cxn modelId="{DBBFDF91-79DD-4814-9B4B-CC1855DA80F0}" type="presOf" srcId="{F0E30E0C-4963-4599-AE0B-2032E9B47C22}" destId="{C8B4AF29-F8B2-4B5C-9A0A-4318A0FDAA67}" srcOrd="0" destOrd="2" presId="urn:microsoft.com/office/officeart/2005/8/layout/process2"/>
+    <dgm:cxn modelId="{A01C1220-99F6-47E5-B9B9-74061C5C5F2E}" srcId="{90EE368B-DF41-4BB4-B5CF-4E43F785E9C7}" destId="{15DBC0A0-906C-473F-8D0C-89DD2EC3CDC2}" srcOrd="2" destOrd="0" parTransId="{F787DCBF-07E8-4750-A3AD-252E82530C24}" sibTransId="{CB0E1016-BECD-4ADF-92D8-4841E7C09CE9}"/>
     <dgm:cxn modelId="{7145755B-94EE-4EB6-8CF6-5579F00E03E6}" srcId="{49C90B1B-350C-495E-A6BA-77729B5C1025}" destId="{4DD1E021-0811-4EF9-B78E-DDB0248FD1BD}" srcOrd="0" destOrd="0" parTransId="{CD86E85A-9FF9-469E-9E72-F775E801B96E}" sibTransId="{C228AEA6-31A3-4EE5-AB7D-4C4C46C1300B}"/>
     <dgm:cxn modelId="{DBFCD182-8EE9-4E5A-85EC-9DDF922A78E0}" srcId="{49C90B1B-350C-495E-A6BA-77729B5C1025}" destId="{6FCA2806-F51C-4D2D-89A8-8E18F0904965}" srcOrd="1" destOrd="0" parTransId="{A62CE099-D8B7-42AE-BBDA-2F73D68B3DB5}" sibTransId="{F5285924-C871-4665-8E75-CF4ACF7A6B04}"/>
     <dgm:cxn modelId="{42528BEE-BAB1-4F17-9697-82CB7877D17D}" type="presOf" srcId="{4518F0E6-1458-4A52-90C5-256335DE3373}" destId="{316DCBA6-B9ED-4796-B23D-A21A99D2036C}" srcOrd="1" destOrd="0" presId="urn:microsoft.com/office/officeart/2005/8/layout/process2"/>
@@ -2215,9 +2437,12 @@
     <dgm:cxn modelId="{C184BDE3-D1F9-4E18-AF16-A15B00AA9247}" type="presOf" srcId="{D2A5F00B-7541-4379-8085-62CCE5822ADD}" destId="{C8B4AF29-F8B2-4B5C-9A0A-4318A0FDAA67}" srcOrd="0" destOrd="0" presId="urn:microsoft.com/office/officeart/2005/8/layout/process2"/>
     <dgm:cxn modelId="{EDB826DB-1F72-4124-BECF-C735EE99930C}" type="presOf" srcId="{46F35A63-548E-451D-BE3E-43DA6EAFB469}" destId="{F88DA77E-5075-4DFD-A626-16139537C385}" srcOrd="0" destOrd="3" presId="urn:microsoft.com/office/officeart/2005/8/layout/process2"/>
     <dgm:cxn modelId="{98FEEC88-C38E-4F21-BF51-799D4296CF62}" srcId="{16993775-A1B3-4465-9450-559FE64AD127}" destId="{10ACB5D6-FB1B-459C-8135-D22AB1DB661E}" srcOrd="0" destOrd="0" parTransId="{8B1B2407-5D15-4F59-8740-31BFB329EC56}" sibTransId="{7212C7D6-7E2C-4128-93E1-07CA6CF003C5}"/>
+    <dgm:cxn modelId="{B0CFCAAE-86F0-4CC7-A998-9021F8AC4F5E}" type="presOf" srcId="{2EDBA865-005C-46EA-80FF-2AFDEBF73CAF}" destId="{D2E47E72-15F6-4EFC-A61F-8766144EE0D8}" srcOrd="0" destOrd="2" presId="urn:microsoft.com/office/officeart/2005/8/layout/process2"/>
+    <dgm:cxn modelId="{FFC86EB3-83E4-436D-BEB2-706068389B63}" type="presOf" srcId="{32CD54E3-E64B-481A-B44C-B1E26CF3D195}" destId="{E04BC851-4077-4081-A3BE-7625339DCA10}" srcOrd="0" destOrd="0" presId="urn:microsoft.com/office/officeart/2005/8/layout/process2"/>
     <dgm:cxn modelId="{D6754492-00E3-4CA7-9AF6-6C5305D70542}" type="presOf" srcId="{485B0A70-06BD-4D35-B668-ED58761A182E}" destId="{27943FF0-9052-42FC-9D2A-94DC53C9046A}" srcOrd="1" destOrd="0" presId="urn:microsoft.com/office/officeart/2005/8/layout/process2"/>
     <dgm:cxn modelId="{1651A04D-BE5E-49CF-84E5-B3BA4A7B052E}" srcId="{0B8005AB-D61F-456D-8C11-6F67918EA96C}" destId="{078E7D13-27B0-4F7A-ABBD-4BD631A7688D}" srcOrd="1" destOrd="0" parTransId="{DE508F71-CB30-4B9D-B362-E1DD00D2CD00}" sibTransId="{3EE11CF5-E6E3-45F3-A724-C38D85543BE0}"/>
     <dgm:cxn modelId="{87DCEE0A-77EF-443E-92A1-C3B041540A79}" type="presOf" srcId="{E699BA99-F2C0-4A7C-828E-8062B36FF2FF}" destId="{F88DA77E-5075-4DFD-A626-16139537C385}" srcOrd="0" destOrd="5" presId="urn:microsoft.com/office/officeart/2005/8/layout/process2"/>
+    <dgm:cxn modelId="{F88E4D53-1584-41A7-AB91-0212BA80DBA6}" type="presOf" srcId="{6A550D35-C354-4B77-A295-7EB9ACCA6F69}" destId="{D2E47E72-15F6-4EFC-A61F-8766144EE0D8}" srcOrd="0" destOrd="4" presId="urn:microsoft.com/office/officeart/2005/8/layout/process2"/>
     <dgm:cxn modelId="{E02702D7-DFBA-4E72-B2B4-405A7F0C1020}" type="presParOf" srcId="{69A4926D-2EDD-467E-AF23-E402B22BF067}" destId="{C8B4AF29-F8B2-4B5C-9A0A-4318A0FDAA67}" srcOrd="0" destOrd="0" presId="urn:microsoft.com/office/officeart/2005/8/layout/process2"/>
     <dgm:cxn modelId="{BE399AFF-4A3D-490A-933B-98867540239A}" type="presParOf" srcId="{69A4926D-2EDD-467E-AF23-E402B22BF067}" destId="{AB32203C-6605-47CB-9C1E-BA71B646A831}" srcOrd="1" destOrd="0" presId="urn:microsoft.com/office/officeart/2005/8/layout/process2"/>
     <dgm:cxn modelId="{1CE53380-ECAF-4E94-900C-104B8A24FD1C}" type="presParOf" srcId="{AB32203C-6605-47CB-9C1E-BA71B646A831}" destId="{AEAFAB2C-C82E-445E-A509-0DB7B4BBA7C6}" srcOrd="0" destOrd="0" presId="urn:microsoft.com/office/officeart/2005/8/layout/process2"/>
@@ -2234,6 +2459,9 @@
     <dgm:cxn modelId="{3EA23276-6A92-4EDC-A848-23405469CEB9}" type="presParOf" srcId="{69A4926D-2EDD-467E-AF23-E402B22BF067}" destId="{AE9CB4F5-053D-4F08-A1E7-809CD882C798}" srcOrd="9" destOrd="0" presId="urn:microsoft.com/office/officeart/2005/8/layout/process2"/>
     <dgm:cxn modelId="{0B681021-1671-47DB-BF81-72D3CFBA1DC7}" type="presParOf" srcId="{AE9CB4F5-053D-4F08-A1E7-809CD882C798}" destId="{A5F5FD2B-D354-4C95-B039-8B9B252B242F}" srcOrd="0" destOrd="0" presId="urn:microsoft.com/office/officeart/2005/8/layout/process2"/>
     <dgm:cxn modelId="{8EDD85C2-3CC7-4F06-99D3-39E1142FD829}" type="presParOf" srcId="{69A4926D-2EDD-467E-AF23-E402B22BF067}" destId="{0623080B-F2D3-4BDD-A4AE-88ADA437E8EF}" srcOrd="10" destOrd="0" presId="urn:microsoft.com/office/officeart/2005/8/layout/process2"/>
+    <dgm:cxn modelId="{CCF01543-B0F0-485A-BA71-86D64C0E3CA9}" type="presParOf" srcId="{69A4926D-2EDD-467E-AF23-E402B22BF067}" destId="{E04BC851-4077-4081-A3BE-7625339DCA10}" srcOrd="11" destOrd="0" presId="urn:microsoft.com/office/officeart/2005/8/layout/process2"/>
+    <dgm:cxn modelId="{19A39875-B307-4640-B08C-2AAFDFCA19B5}" type="presParOf" srcId="{E04BC851-4077-4081-A3BE-7625339DCA10}" destId="{3CBE53E0-FC52-4051-A6A8-0DD747FB7D18}" srcOrd="0" destOrd="0" presId="urn:microsoft.com/office/officeart/2005/8/layout/process2"/>
+    <dgm:cxn modelId="{28590B8A-67CD-452C-9347-2F9DFD1D558C}" type="presParOf" srcId="{69A4926D-2EDD-467E-AF23-E402B22BF067}" destId="{D2E47E72-15F6-4EFC-A61F-8766144EE0D8}" srcOrd="12" destOrd="0" presId="urn:microsoft.com/office/officeart/2005/8/layout/process2"/>
   </dgm:cxnLst>
   <dgm:bg/>
   <dgm:whole/>
@@ -2263,8 +2491,8 @@
       </dsp:nvSpPr>
       <dsp:spPr>
         <a:xfrm>
-          <a:off x="757847" y="5529"/>
-          <a:ext cx="6120008" cy="599496"/>
+          <a:off x="1278719" y="5945"/>
+          <a:ext cx="5119828" cy="501522"/>
         </a:xfrm>
         <a:prstGeom prst="roundRect">
           <a:avLst>
@@ -2395,11 +2623,7 @@
           </a:pPr>
           <a:r>
             <a:rPr lang="en-US" sz="900" kern="1200" dirty="0" smtClean="0"/>
-            <a:t> Prepare input datasets (Sub-set assets, </a:t>
-          </a:r>
-          <a:r>
-            <a:rPr lang="en-US" sz="900" kern="1200" dirty="0" smtClean="0"/>
-            <a:t>LCM, Floodplain, </a:t>
+            <a:t> Prepare input datasets (Sub-set assets, LCM, Floodplain, </a:t>
           </a:r>
           <a:r>
             <a:rPr lang="en-US" sz="900" kern="1200" dirty="0" err="1" smtClean="0"/>
@@ -2421,8 +2645,8 @@
         </a:p>
       </dsp:txBody>
       <dsp:txXfrm>
-        <a:off x="775406" y="23088"/>
-        <a:ext cx="6084890" cy="564378"/>
+        <a:off x="1293408" y="20634"/>
+        <a:ext cx="5090450" cy="472144"/>
       </dsp:txXfrm>
     </dsp:sp>
     <dsp:sp modelId="{AB32203C-6605-47CB-9C1E-BA71B646A831}">
@@ -2432,8 +2656,8 @@
       </dsp:nvSpPr>
       <dsp:spPr>
         <a:xfrm rot="5400000">
-          <a:off x="3679169" y="623516"/>
-          <a:ext cx="277363" cy="332835"/>
+          <a:off x="3722616" y="522936"/>
+          <a:ext cx="232034" cy="278441"/>
         </a:xfrm>
         <a:prstGeom prst="rightArrow">
           <a:avLst>
@@ -2507,7 +2731,7 @@
         </a:bodyPr>
         <a:lstStyle/>
         <a:p>
-          <a:pPr lvl="0" algn="ctr" defTabSz="577850">
+          <a:pPr lvl="0" algn="ctr" defTabSz="488950">
             <a:lnSpc>
               <a:spcPct val="90000"/>
             </a:lnSpc>
@@ -2518,12 +2742,12 @@
               <a:spcPct val="35000"/>
             </a:spcAft>
           </a:pPr>
-          <a:endParaRPr lang="en-US" sz="1300" kern="1200" dirty="0"/>
+          <a:endParaRPr lang="en-US" sz="1100" kern="1200" dirty="0"/>
         </a:p>
       </dsp:txBody>
       <dsp:txXfrm rot="-5400000">
-        <a:off x="3718001" y="651252"/>
-        <a:ext cx="199701" cy="194154"/>
+        <a:off x="3755101" y="546139"/>
+        <a:ext cx="167065" cy="162424"/>
       </dsp:txXfrm>
     </dsp:sp>
     <dsp:sp modelId="{EBB63F27-B095-46AF-B7D4-749C71931F9F}">
@@ -2533,8 +2757,8 @@
       </dsp:nvSpPr>
       <dsp:spPr>
         <a:xfrm>
-          <a:off x="757847" y="974843"/>
-          <a:ext cx="6120008" cy="799952"/>
+          <a:off x="1278719" y="816846"/>
+          <a:ext cx="5119828" cy="669217"/>
         </a:xfrm>
         <a:prstGeom prst="roundRect">
           <a:avLst>
@@ -2549,7 +2773,7 @@
                 <a:hueOff val="0"/>
                 <a:satOff val="0"/>
                 <a:lumOff val="0"/>
-                <a:alphaOff val="-8000"/>
+                <a:alphaOff val="-6667"/>
                 <a:lumMod val="110000"/>
                 <a:satMod val="105000"/>
                 <a:tint val="67000"/>
@@ -2561,7 +2785,7 @@
                 <a:hueOff val="0"/>
                 <a:satOff val="0"/>
                 <a:lumOff val="0"/>
-                <a:alphaOff val="-8000"/>
+                <a:alphaOff val="-6667"/>
                 <a:lumMod val="105000"/>
                 <a:satMod val="103000"/>
                 <a:tint val="73000"/>
@@ -2573,7 +2797,7 @@
                 <a:hueOff val="0"/>
                 <a:satOff val="0"/>
                 <a:lumOff val="0"/>
-                <a:alphaOff val="-8000"/>
+                <a:alphaOff val="-6667"/>
                 <a:lumMod val="105000"/>
                 <a:satMod val="109000"/>
                 <a:tint val="81000"/>
@@ -2690,8 +2914,8 @@
         </a:p>
       </dsp:txBody>
       <dsp:txXfrm>
-        <a:off x="781277" y="998273"/>
-        <a:ext cx="6073148" cy="753092"/>
+        <a:off x="1298320" y="836447"/>
+        <a:ext cx="5080626" cy="630015"/>
       </dsp:txXfrm>
     </dsp:sp>
     <dsp:sp modelId="{7D2A00C7-6363-46B9-9825-DD209EB38952}">
@@ -2701,8 +2925,8 @@
       </dsp:nvSpPr>
       <dsp:spPr>
         <a:xfrm rot="5400000">
-          <a:off x="3679169" y="1793286"/>
-          <a:ext cx="277363" cy="332835"/>
+          <a:off x="3722616" y="1501533"/>
+          <a:ext cx="232034" cy="278441"/>
         </a:xfrm>
         <a:prstGeom prst="rightArrow">
           <a:avLst>
@@ -2715,9 +2939,9 @@
             <a:gs pos="0">
               <a:schemeClr val="accent6">
                 <a:shade val="90000"/>
-                <a:hueOff val="94967"/>
-                <a:satOff val="-3793"/>
-                <a:lumOff val="8798"/>
+                <a:hueOff val="75974"/>
+                <a:satOff val="-3035"/>
+                <a:lumOff val="7038"/>
                 <a:alphaOff val="0"/>
                 <a:lumMod val="110000"/>
                 <a:satMod val="105000"/>
@@ -2727,9 +2951,9 @@
             <a:gs pos="50000">
               <a:schemeClr val="accent6">
                 <a:shade val="90000"/>
-                <a:hueOff val="94967"/>
-                <a:satOff val="-3793"/>
-                <a:lumOff val="8798"/>
+                <a:hueOff val="75974"/>
+                <a:satOff val="-3035"/>
+                <a:lumOff val="7038"/>
                 <a:alphaOff val="0"/>
                 <a:lumMod val="105000"/>
                 <a:satMod val="103000"/>
@@ -2739,9 +2963,9 @@
             <a:gs pos="100000">
               <a:schemeClr val="accent6">
                 <a:shade val="90000"/>
-                <a:hueOff val="94967"/>
-                <a:satOff val="-3793"/>
-                <a:lumOff val="8798"/>
+                <a:hueOff val="75974"/>
+                <a:satOff val="-3035"/>
+                <a:lumOff val="7038"/>
                 <a:alphaOff val="0"/>
                 <a:lumMod val="105000"/>
                 <a:satMod val="109000"/>
@@ -2776,7 +3000,7 @@
         </a:bodyPr>
         <a:lstStyle/>
         <a:p>
-          <a:pPr lvl="0" algn="ctr" defTabSz="577850">
+          <a:pPr lvl="0" algn="ctr" defTabSz="488950">
             <a:lnSpc>
               <a:spcPct val="90000"/>
             </a:lnSpc>
@@ -2787,12 +3011,12 @@
               <a:spcPct val="35000"/>
             </a:spcAft>
           </a:pPr>
-          <a:endParaRPr lang="en-US" sz="1300" kern="1200" dirty="0"/>
+          <a:endParaRPr lang="en-US" sz="1100" kern="1200" dirty="0"/>
         </a:p>
       </dsp:txBody>
       <dsp:txXfrm rot="-5400000">
-        <a:off x="3718001" y="1821022"/>
-        <a:ext cx="199701" cy="194154"/>
+        <a:off x="3755101" y="1524736"/>
+        <a:ext cx="167065" cy="162424"/>
       </dsp:txXfrm>
     </dsp:sp>
     <dsp:sp modelId="{F35FA51F-D25E-4A0E-9B7A-7980DF29C0D3}">
@@ -2802,8 +3026,8 @@
       </dsp:nvSpPr>
       <dsp:spPr>
         <a:xfrm>
-          <a:off x="757847" y="2144613"/>
-          <a:ext cx="6120008" cy="911415"/>
+          <a:off x="1278719" y="1795443"/>
+          <a:ext cx="5119828" cy="762464"/>
         </a:xfrm>
         <a:prstGeom prst="roundRect">
           <a:avLst>
@@ -2818,7 +3042,7 @@
                 <a:hueOff val="0"/>
                 <a:satOff val="0"/>
                 <a:lumOff val="0"/>
-                <a:alphaOff val="-16000"/>
+                <a:alphaOff val="-13333"/>
                 <a:lumMod val="110000"/>
                 <a:satMod val="105000"/>
                 <a:tint val="67000"/>
@@ -2830,7 +3054,7 @@
                 <a:hueOff val="0"/>
                 <a:satOff val="0"/>
                 <a:lumOff val="0"/>
-                <a:alphaOff val="-16000"/>
+                <a:alphaOff val="-13333"/>
                 <a:lumMod val="105000"/>
                 <a:satMod val="103000"/>
                 <a:tint val="73000"/>
@@ -2842,7 +3066,7 @@
                 <a:hueOff val="0"/>
                 <a:satOff val="0"/>
                 <a:lumOff val="0"/>
-                <a:alphaOff val="-16000"/>
+                <a:alphaOff val="-13333"/>
                 <a:lumMod val="105000"/>
                 <a:satMod val="109000"/>
                 <a:tint val="81000"/>
@@ -2963,8 +3187,8 @@
         </a:p>
       </dsp:txBody>
       <dsp:txXfrm>
-        <a:off x="784541" y="2171307"/>
-        <a:ext cx="6066620" cy="858027"/>
+        <a:off x="1301051" y="1817775"/>
+        <a:ext cx="5075164" cy="717800"/>
       </dsp:txXfrm>
     </dsp:sp>
     <dsp:sp modelId="{B899CA72-4432-44BC-8D29-47203ECE9433}">
@@ -2974,8 +3198,8 @@
       </dsp:nvSpPr>
       <dsp:spPr>
         <a:xfrm rot="5357799">
-          <a:off x="3699289" y="3057895"/>
-          <a:ext cx="252444" cy="332835"/>
+          <a:off x="3739447" y="2559469"/>
+          <a:ext cx="211188" cy="278441"/>
         </a:xfrm>
         <a:prstGeom prst="rightArrow">
           <a:avLst>
@@ -2988,9 +3212,9 @@
             <a:gs pos="0">
               <a:schemeClr val="accent6">
                 <a:shade val="90000"/>
-                <a:hueOff val="189935"/>
-                <a:satOff val="-7587"/>
-                <a:lumOff val="17596"/>
+                <a:hueOff val="151948"/>
+                <a:satOff val="-6069"/>
+                <a:lumOff val="14076"/>
                 <a:alphaOff val="0"/>
                 <a:lumMod val="110000"/>
                 <a:satMod val="105000"/>
@@ -3000,9 +3224,9 @@
             <a:gs pos="50000">
               <a:schemeClr val="accent6">
                 <a:shade val="90000"/>
-                <a:hueOff val="189935"/>
-                <a:satOff val="-7587"/>
-                <a:lumOff val="17596"/>
+                <a:hueOff val="151948"/>
+                <a:satOff val="-6069"/>
+                <a:lumOff val="14076"/>
                 <a:alphaOff val="0"/>
                 <a:lumMod val="105000"/>
                 <a:satMod val="103000"/>
@@ -3012,9 +3236,9 @@
             <a:gs pos="100000">
               <a:schemeClr val="accent6">
                 <a:shade val="90000"/>
-                <a:hueOff val="189935"/>
-                <a:satOff val="-7587"/>
-                <a:lumOff val="17596"/>
+                <a:hueOff val="151948"/>
+                <a:satOff val="-6069"/>
+                <a:lumOff val="14076"/>
                 <a:alphaOff val="0"/>
                 <a:lumMod val="105000"/>
                 <a:satMod val="109000"/>
@@ -3049,7 +3273,7 @@
         </a:bodyPr>
         <a:lstStyle/>
         <a:p>
-          <a:pPr lvl="0" algn="ctr" defTabSz="533400">
+          <a:pPr lvl="0" algn="ctr" defTabSz="444500">
             <a:lnSpc>
               <a:spcPct val="90000"/>
             </a:lnSpc>
@@ -3060,12 +3284,12 @@
               <a:spcPct val="35000"/>
             </a:spcAft>
           </a:pPr>
-          <a:endParaRPr lang="en-US" sz="1200" kern="1200"/>
+          <a:endParaRPr lang="en-US" sz="1000" kern="1200"/>
         </a:p>
       </dsp:txBody>
       <dsp:txXfrm rot="-5400000">
-        <a:off x="3725196" y="3098093"/>
-        <a:ext cx="199701" cy="176711"/>
+        <a:off x="3761120" y="2593097"/>
+        <a:ext cx="167065" cy="147832"/>
       </dsp:txXfrm>
     </dsp:sp>
     <dsp:sp modelId="{F88DA77E-5075-4DFD-A626-16139537C385}">
@@ -3075,8 +3299,8 @@
       </dsp:nvSpPr>
       <dsp:spPr>
         <a:xfrm>
-          <a:off x="774474" y="3392596"/>
-          <a:ext cx="6120008" cy="1124208"/>
+          <a:off x="1292628" y="2839471"/>
+          <a:ext cx="5119828" cy="940481"/>
         </a:xfrm>
         <a:prstGeom prst="roundRect">
           <a:avLst>
@@ -3091,7 +3315,7 @@
                 <a:hueOff val="0"/>
                 <a:satOff val="0"/>
                 <a:lumOff val="0"/>
-                <a:alphaOff val="-24000"/>
+                <a:alphaOff val="-20000"/>
                 <a:lumMod val="110000"/>
                 <a:satMod val="105000"/>
                 <a:tint val="67000"/>
@@ -3103,7 +3327,7 @@
                 <a:hueOff val="0"/>
                 <a:satOff val="0"/>
                 <a:lumOff val="0"/>
-                <a:alphaOff val="-24000"/>
+                <a:alphaOff val="-20000"/>
                 <a:lumMod val="105000"/>
                 <a:satMod val="103000"/>
                 <a:tint val="73000"/>
@@ -3115,7 +3339,7 @@
                 <a:hueOff val="0"/>
                 <a:satOff val="0"/>
                 <a:lumOff val="0"/>
-                <a:alphaOff val="-24000"/>
+                <a:alphaOff val="-20000"/>
                 <a:lumMod val="105000"/>
                 <a:satMod val="109000"/>
                 <a:tint val="81000"/>
@@ -3274,8 +3498,8 @@
         </a:p>
       </dsp:txBody>
       <dsp:txXfrm>
-        <a:off x="807401" y="3425523"/>
-        <a:ext cx="6054154" cy="1058354"/>
+        <a:off x="1320174" y="2867017"/>
+        <a:ext cx="5064736" cy="885389"/>
       </dsp:txXfrm>
     </dsp:sp>
     <dsp:sp modelId="{A55B3566-2B07-4604-AAB8-DD63E2B590AA}">
@@ -3284,9 +3508,9 @@
         <dsp:cNvSpPr/>
       </dsp:nvSpPr>
       <dsp:spPr>
-        <a:xfrm rot="5443187">
-          <a:off x="3673722" y="4551921"/>
-          <a:ext cx="302324" cy="332835"/>
+        <a:xfrm rot="5438983">
+          <a:off x="3718842" y="3809330"/>
+          <a:ext cx="252912" cy="278441"/>
         </a:xfrm>
         <a:prstGeom prst="rightArrow">
           <a:avLst>
@@ -3299,9 +3523,9 @@
             <a:gs pos="0">
               <a:schemeClr val="accent6">
                 <a:shade val="90000"/>
-                <a:hueOff val="284902"/>
-                <a:satOff val="-11380"/>
-                <a:lumOff val="26393"/>
+                <a:hueOff val="227922"/>
+                <a:satOff val="-9104"/>
+                <a:lumOff val="21115"/>
                 <a:alphaOff val="0"/>
                 <a:lumMod val="110000"/>
                 <a:satMod val="105000"/>
@@ -3311,9 +3535,9 @@
             <a:gs pos="50000">
               <a:schemeClr val="accent6">
                 <a:shade val="90000"/>
-                <a:hueOff val="284902"/>
-                <a:satOff val="-11380"/>
-                <a:lumOff val="26393"/>
+                <a:hueOff val="227922"/>
+                <a:satOff val="-9104"/>
+                <a:lumOff val="21115"/>
                 <a:alphaOff val="0"/>
                 <a:lumMod val="105000"/>
                 <a:satMod val="103000"/>
@@ -3323,9 +3547,9 @@
             <a:gs pos="100000">
               <a:schemeClr val="accent6">
                 <a:shade val="90000"/>
-                <a:hueOff val="284902"/>
-                <a:satOff val="-11380"/>
-                <a:lumOff val="26393"/>
+                <a:hueOff val="227922"/>
+                <a:satOff val="-9104"/>
+                <a:lumOff val="21115"/>
                 <a:alphaOff val="0"/>
                 <a:lumMod val="105000"/>
                 <a:satMod val="109000"/>
@@ -3360,7 +3584,7 @@
         </a:bodyPr>
         <a:lstStyle/>
         <a:p>
-          <a:pPr lvl="0" algn="ctr" defTabSz="666750">
+          <a:pPr lvl="0" algn="ctr" defTabSz="533400">
             <a:lnSpc>
               <a:spcPct val="90000"/>
             </a:lnSpc>
@@ -3371,12 +3595,12 @@
               <a:spcPct val="35000"/>
             </a:spcAft>
           </a:pPr>
-          <a:endParaRPr lang="en-US" sz="1500" kern="1200"/>
+          <a:endParaRPr lang="en-US" sz="1200" kern="1200"/>
         </a:p>
       </dsp:txBody>
       <dsp:txXfrm rot="-5400000">
-        <a:off x="3725603" y="4567180"/>
-        <a:ext cx="199701" cy="211627"/>
+        <a:off x="3762195" y="3822097"/>
+        <a:ext cx="167065" cy="177038"/>
       </dsp:txXfrm>
     </dsp:sp>
     <dsp:sp modelId="{3D7F7322-53B4-41B9-9E72-0AAACD791497}">
@@ -3386,8 +3610,8 @@
       </dsp:nvSpPr>
       <dsp:spPr>
         <a:xfrm>
-          <a:off x="757847" y="4919873"/>
-          <a:ext cx="6120008" cy="716588"/>
+          <a:off x="1278719" y="4117148"/>
+          <a:ext cx="5119828" cy="838312"/>
         </a:xfrm>
         <a:prstGeom prst="roundRect">
           <a:avLst>
@@ -3402,7 +3626,7 @@
                 <a:hueOff val="0"/>
                 <a:satOff val="0"/>
                 <a:lumOff val="0"/>
-                <a:alphaOff val="-32000"/>
+                <a:alphaOff val="-26667"/>
                 <a:lumMod val="110000"/>
                 <a:satMod val="105000"/>
                 <a:tint val="67000"/>
@@ -3414,7 +3638,7 @@
                 <a:hueOff val="0"/>
                 <a:satOff val="0"/>
                 <a:lumOff val="0"/>
-                <a:alphaOff val="-32000"/>
+                <a:alphaOff val="-26667"/>
                 <a:lumMod val="105000"/>
                 <a:satMod val="103000"/>
                 <a:tint val="73000"/>
@@ -3426,7 +3650,7 @@
                 <a:hueOff val="0"/>
                 <a:satOff val="0"/>
                 <a:lumOff val="0"/>
-                <a:alphaOff val="-32000"/>
+                <a:alphaOff val="-26667"/>
                 <a:lumMod val="105000"/>
                 <a:satMod val="109000"/>
                 <a:tint val="81000"/>
@@ -3553,18 +3777,14 @@
           </a:r>
           <a:r>
             <a:rPr lang="en-US" sz="900" kern="1200" dirty="0" smtClean="0"/>
-            <a:t> to </a:t>
-          </a:r>
-          <a:r>
-            <a:rPr lang="en-US" sz="900" kern="1200" dirty="0" smtClean="0"/>
-            <a:t>margin, Land use intensity per partition</a:t>
+            <a:t> to margin, Land use intensity per partition</a:t>
           </a:r>
           <a:endParaRPr lang="en-US" sz="900" kern="1200" dirty="0"/>
         </a:p>
       </dsp:txBody>
       <dsp:txXfrm>
-        <a:off x="778835" y="4940861"/>
-        <a:ext cx="6078032" cy="674612"/>
+        <a:off x="1303272" y="4141701"/>
+        <a:ext cx="5070722" cy="789206"/>
       </dsp:txXfrm>
     </dsp:sp>
     <dsp:sp modelId="{AE9CB4F5-053D-4F08-A1E7-809CD882C798}">
@@ -3574,8 +3794,258 @@
       </dsp:nvSpPr>
       <dsp:spPr>
         <a:xfrm rot="5400000">
-          <a:off x="3679169" y="5654952"/>
-          <a:ext cx="277363" cy="332835"/>
+          <a:off x="3722616" y="4970929"/>
+          <a:ext cx="232034" cy="278441"/>
+        </a:xfrm>
+        <a:prstGeom prst="rightArrow">
+          <a:avLst>
+            <a:gd name="adj1" fmla="val 60000"/>
+            <a:gd name="adj2" fmla="val 50000"/>
+          </a:avLst>
+        </a:prstGeom>
+        <a:gradFill rotWithShape="0">
+          <a:gsLst>
+            <a:gs pos="0">
+              <a:schemeClr val="accent6">
+                <a:shade val="90000"/>
+                <a:hueOff val="303896"/>
+                <a:satOff val="-12138"/>
+                <a:lumOff val="28153"/>
+                <a:alphaOff val="0"/>
+                <a:lumMod val="110000"/>
+                <a:satMod val="105000"/>
+                <a:tint val="67000"/>
+              </a:schemeClr>
+            </a:gs>
+            <a:gs pos="50000">
+              <a:schemeClr val="accent6">
+                <a:shade val="90000"/>
+                <a:hueOff val="303896"/>
+                <a:satOff val="-12138"/>
+                <a:lumOff val="28153"/>
+                <a:alphaOff val="0"/>
+                <a:lumMod val="105000"/>
+                <a:satMod val="103000"/>
+                <a:tint val="73000"/>
+              </a:schemeClr>
+            </a:gs>
+            <a:gs pos="100000">
+              <a:schemeClr val="accent6">
+                <a:shade val="90000"/>
+                <a:hueOff val="303896"/>
+                <a:satOff val="-12138"/>
+                <a:lumOff val="28153"/>
+                <a:alphaOff val="0"/>
+                <a:lumMod val="105000"/>
+                <a:satMod val="109000"/>
+                <a:tint val="81000"/>
+              </a:schemeClr>
+            </a:gs>
+          </a:gsLst>
+          <a:lin ang="5400000" scaled="0"/>
+        </a:gradFill>
+        <a:ln>
+          <a:noFill/>
+        </a:ln>
+        <a:effectLst/>
+      </dsp:spPr>
+      <dsp:style>
+        <a:lnRef idx="0">
+          <a:scrgbClr r="0" g="0" b="0"/>
+        </a:lnRef>
+        <a:fillRef idx="2">
+          <a:scrgbClr r="0" g="0" b="0"/>
+        </a:fillRef>
+        <a:effectRef idx="1">
+          <a:scrgbClr r="0" g="0" b="0"/>
+        </a:effectRef>
+        <a:fontRef idx="minor">
+          <a:schemeClr val="dk1"/>
+        </a:fontRef>
+      </dsp:style>
+      <dsp:txBody>
+        <a:bodyPr spcFirstLastPara="0" vert="horz" wrap="square" lIns="0" tIns="0" rIns="0" bIns="0" numCol="1" spcCol="1270" anchor="ctr" anchorCtr="0">
+          <a:noAutofit/>
+        </a:bodyPr>
+        <a:lstStyle/>
+        <a:p>
+          <a:pPr lvl="0" algn="ctr" defTabSz="488950">
+            <a:lnSpc>
+              <a:spcPct val="90000"/>
+            </a:lnSpc>
+            <a:spcBef>
+              <a:spcPct val="0"/>
+            </a:spcBef>
+            <a:spcAft>
+              <a:spcPct val="35000"/>
+            </a:spcAft>
+          </a:pPr>
+          <a:endParaRPr lang="en-US" sz="1100" kern="1200" dirty="0"/>
+        </a:p>
+      </dsp:txBody>
+      <dsp:txXfrm rot="-5400000">
+        <a:off x="3755101" y="4994132"/>
+        <a:ext cx="167065" cy="162424"/>
+      </dsp:txXfrm>
+    </dsp:sp>
+    <dsp:sp modelId="{0623080B-F2D3-4BDD-A4AE-88ADA437E8EF}">
+      <dsp:nvSpPr>
+        <dsp:cNvPr id="0" name=""/>
+        <dsp:cNvSpPr/>
+      </dsp:nvSpPr>
+      <dsp:spPr>
+        <a:xfrm>
+          <a:off x="1278719" y="5264839"/>
+          <a:ext cx="5119828" cy="408869"/>
+        </a:xfrm>
+        <a:prstGeom prst="roundRect">
+          <a:avLst>
+            <a:gd name="adj" fmla="val 10000"/>
+          </a:avLst>
+        </a:prstGeom>
+        <a:gradFill rotWithShape="0">
+          <a:gsLst>
+            <a:gs pos="0">
+              <a:schemeClr val="accent6">
+                <a:alpha val="90000"/>
+                <a:hueOff val="0"/>
+                <a:satOff val="0"/>
+                <a:lumOff val="0"/>
+                <a:alphaOff val="-33333"/>
+                <a:lumMod val="110000"/>
+                <a:satMod val="105000"/>
+                <a:tint val="67000"/>
+              </a:schemeClr>
+            </a:gs>
+            <a:gs pos="50000">
+              <a:schemeClr val="accent6">
+                <a:alpha val="90000"/>
+                <a:hueOff val="0"/>
+                <a:satOff val="0"/>
+                <a:lumOff val="0"/>
+                <a:alphaOff val="-33333"/>
+                <a:lumMod val="105000"/>
+                <a:satMod val="103000"/>
+                <a:tint val="73000"/>
+              </a:schemeClr>
+            </a:gs>
+            <a:gs pos="100000">
+              <a:schemeClr val="accent6">
+                <a:alpha val="90000"/>
+                <a:hueOff val="0"/>
+                <a:satOff val="0"/>
+                <a:lumOff val="0"/>
+                <a:alphaOff val="-33333"/>
+                <a:lumMod val="105000"/>
+                <a:satMod val="109000"/>
+                <a:tint val="81000"/>
+              </a:schemeClr>
+            </a:gs>
+          </a:gsLst>
+          <a:lin ang="5400000" scaled="0"/>
+        </a:gradFill>
+        <a:ln>
+          <a:noFill/>
+        </a:ln>
+        <a:effectLst/>
+        <a:scene3d>
+          <a:camera prst="orthographicFront"/>
+          <a:lightRig rig="flat" dir="t"/>
+        </a:scene3d>
+        <a:sp3d prstMaterial="dkEdge">
+          <a:bevelT w="8200" h="38100"/>
+        </a:sp3d>
+      </dsp:spPr>
+      <dsp:style>
+        <a:lnRef idx="0">
+          <a:scrgbClr r="0" g="0" b="0"/>
+        </a:lnRef>
+        <a:fillRef idx="2">
+          <a:scrgbClr r="0" g="0" b="0"/>
+        </a:fillRef>
+        <a:effectRef idx="1">
+          <a:scrgbClr r="0" g="0" b="0"/>
+        </a:effectRef>
+        <a:fontRef idx="minor">
+          <a:schemeClr val="dk1"/>
+        </a:fontRef>
+      </dsp:style>
+      <dsp:txBody>
+        <a:bodyPr spcFirstLastPara="0" vert="horz" wrap="square" lIns="34290" tIns="34290" rIns="34290" bIns="34290" numCol="1" spcCol="1270" anchor="ctr" anchorCtr="0">
+          <a:noAutofit/>
+        </a:bodyPr>
+        <a:lstStyle/>
+        <a:p>
+          <a:pPr lvl="0" algn="l" defTabSz="400050">
+            <a:lnSpc>
+              <a:spcPct val="90000"/>
+            </a:lnSpc>
+            <a:spcBef>
+              <a:spcPct val="0"/>
+            </a:spcBef>
+            <a:spcAft>
+              <a:spcPct val="35000"/>
+            </a:spcAft>
+          </a:pPr>
+          <a:r>
+            <a:rPr lang="en-US" sz="900" b="1" kern="1200" dirty="0" smtClean="0"/>
+            <a:t>Transfer data</a:t>
+          </a:r>
+          <a:endParaRPr lang="en-US" sz="900" b="1" kern="1200" dirty="0"/>
+        </a:p>
+        <a:p>
+          <a:pPr marL="57150" lvl="1" indent="-57150" algn="l" defTabSz="400050">
+            <a:lnSpc>
+              <a:spcPct val="90000"/>
+            </a:lnSpc>
+            <a:spcBef>
+              <a:spcPct val="0"/>
+            </a:spcBef>
+            <a:spcAft>
+              <a:spcPct val="15000"/>
+            </a:spcAft>
+            <a:buChar char="••"/>
+          </a:pPr>
+          <a:r>
+            <a:rPr lang="en-US" sz="900" kern="1200" dirty="0" smtClean="0"/>
+            <a:t> Run the transfer margin data to segment tool to pass margin based information over to segment</a:t>
+          </a:r>
+          <a:endParaRPr lang="en-US" sz="900" kern="1200" dirty="0"/>
+        </a:p>
+        <a:p>
+          <a:pPr marL="57150" lvl="1" indent="-57150" algn="l" defTabSz="400050">
+            <a:lnSpc>
+              <a:spcPct val="90000"/>
+            </a:lnSpc>
+            <a:spcBef>
+              <a:spcPct val="0"/>
+            </a:spcBef>
+            <a:spcAft>
+              <a:spcPct val="15000"/>
+            </a:spcAft>
+            <a:buChar char="••"/>
+          </a:pPr>
+          <a:r>
+            <a:rPr lang="en-US" sz="900" kern="1200" dirty="0" smtClean="0"/>
+            <a:t> Run transfer DoD data to segment tool</a:t>
+          </a:r>
+          <a:endParaRPr lang="en-US" sz="900" kern="1200" dirty="0"/>
+        </a:p>
+      </dsp:txBody>
+      <dsp:txXfrm>
+        <a:off x="1290694" y="5276814"/>
+        <a:ext cx="5095878" cy="384919"/>
+      </dsp:txXfrm>
+    </dsp:sp>
+    <dsp:sp modelId="{E04BC851-4077-4081-A3BE-7625339DCA10}">
+      <dsp:nvSpPr>
+        <dsp:cNvPr id="0" name=""/>
+        <dsp:cNvSpPr/>
+      </dsp:nvSpPr>
+      <dsp:spPr>
+        <a:xfrm rot="5400000">
+          <a:off x="3722616" y="5689177"/>
+          <a:ext cx="232034" cy="278441"/>
         </a:xfrm>
         <a:prstGeom prst="rightArrow">
           <a:avLst>
@@ -3649,7 +4119,7 @@
         </a:bodyPr>
         <a:lstStyle/>
         <a:p>
-          <a:pPr lvl="0" algn="ctr" defTabSz="577850">
+          <a:pPr lvl="0" algn="ctr" defTabSz="488950">
             <a:lnSpc>
               <a:spcPct val="90000"/>
             </a:lnSpc>
@@ -3660,23 +4130,23 @@
               <a:spcPct val="35000"/>
             </a:spcAft>
           </a:pPr>
-          <a:endParaRPr lang="en-US" sz="1300" kern="1200" dirty="0"/>
+          <a:endParaRPr lang="en-US" sz="1100" kern="1200"/>
         </a:p>
       </dsp:txBody>
       <dsp:txXfrm rot="-5400000">
-        <a:off x="3718001" y="5682688"/>
-        <a:ext cx="199701" cy="194154"/>
+        <a:off x="3755101" y="5712380"/>
+        <a:ext cx="167065" cy="162424"/>
       </dsp:txXfrm>
     </dsp:sp>
-    <dsp:sp modelId="{0623080B-F2D3-4BDD-A4AE-88ADA437E8EF}">
+    <dsp:sp modelId="{D2E47E72-15F6-4EFC-A61F-8766144EE0D8}">
       <dsp:nvSpPr>
         <dsp:cNvPr id="0" name=""/>
         <dsp:cNvSpPr/>
       </dsp:nvSpPr>
       <dsp:spPr>
         <a:xfrm>
-          <a:off x="757847" y="6006279"/>
-          <a:ext cx="6120008" cy="488743"/>
+          <a:off x="1276528" y="5983088"/>
+          <a:ext cx="5124209" cy="794151"/>
         </a:xfrm>
         <a:prstGeom prst="roundRect">
           <a:avLst>
@@ -3769,9 +4239,27 @@
           </a:pPr>
           <a:r>
             <a:rPr lang="en-US" sz="900" b="1" kern="1200" dirty="0" smtClean="0"/>
-            <a:t>Transfer data</a:t>
+            <a:t>Compute bankside/island area of erosion/deposition</a:t>
           </a:r>
-          <a:endParaRPr lang="en-US" sz="900" b="1" kern="1200" dirty="0"/>
+        </a:p>
+        <a:p>
+          <a:pPr marL="57150" lvl="1" indent="-57150" algn="l" defTabSz="400050">
+            <a:lnSpc>
+              <a:spcPct val="90000"/>
+            </a:lnSpc>
+            <a:spcBef>
+              <a:spcPct val="0"/>
+            </a:spcBef>
+            <a:spcAft>
+              <a:spcPct val="15000"/>
+            </a:spcAft>
+            <a:buChar char="••"/>
+          </a:pPr>
+          <a:r>
+            <a:rPr lang="en-US" sz="900" b="0" kern="1200" dirty="0" smtClean="0"/>
+            <a:t>Run compute area of erosion/deposition based upon bank lines</a:t>
+          </a:r>
+          <a:endParaRPr lang="en-US" sz="900" kern="1200" dirty="0"/>
         </a:p>
         <a:p>
           <a:pPr marL="57150" lvl="1" indent="-57150" algn="l" defTabSz="400050">
@@ -3788,7 +4276,7 @@
           </a:pPr>
           <a:r>
             <a:rPr lang="en-US" sz="900" kern="1200" dirty="0" smtClean="0"/>
-            <a:t> Run the transfer margin data to segment tool to pass margin based information over to segment</a:t>
+            <a:t>Run compute area of erosion/deposition for island bank lines</a:t>
           </a:r>
           <a:endParaRPr lang="en-US" sz="900" kern="1200" dirty="0"/>
         </a:p>
@@ -3807,14 +4295,33 @@
           </a:pPr>
           <a:r>
             <a:rPr lang="en-US" sz="900" kern="1200" dirty="0" smtClean="0"/>
-            <a:t> Run transfer DoD data to segment tool</a:t>
+            <a:t>Run Transfer bank data to segments</a:t>
           </a:r>
           <a:endParaRPr lang="en-US" sz="900" kern="1200" dirty="0"/>
         </a:p>
+        <a:p>
+          <a:pPr marL="57150" lvl="1" indent="-57150" algn="l" defTabSz="400050">
+            <a:lnSpc>
+              <a:spcPct val="90000"/>
+            </a:lnSpc>
+            <a:spcBef>
+              <a:spcPct val="0"/>
+            </a:spcBef>
+            <a:spcAft>
+              <a:spcPct val="15000"/>
+            </a:spcAft>
+            <a:buChar char="••"/>
+          </a:pPr>
+          <a:r>
+            <a:rPr lang="en-US" sz="900" kern="1200" dirty="0" smtClean="0"/>
+            <a:t>Create Risk Map</a:t>
+          </a:r>
+          <a:endParaRPr lang="en-US" sz="900" kern="1200" dirty="0"/>
+        </a:p>
       </dsp:txBody>
       <dsp:txXfrm>
-        <a:off x="772162" y="6020594"/>
-        <a:ext cx="6091378" cy="460113"/>
+        <a:off x="1299788" y="6006348"/>
+        <a:ext cx="5077689" cy="747631"/>
       </dsp:txXfrm>
     </dsp:sp>
   </dsp:spTree>
@@ -5161,7 +5668,7 @@
           <a:p>
             <a:fld id="{614C4262-CD6F-46A5-9B43-B159DA78181C}" type="datetimeFigureOut">
               <a:rPr lang="en-GB" smtClean="0"/>
-              <a:t>12/02/2019</a:t>
+              <a:t>26/03/2019</a:t>
             </a:fld>
             <a:endParaRPr lang="en-GB" dirty="0"/>
           </a:p>
@@ -5331,7 +5838,7 @@
           <a:p>
             <a:fld id="{614C4262-CD6F-46A5-9B43-B159DA78181C}" type="datetimeFigureOut">
               <a:rPr lang="en-GB" smtClean="0"/>
-              <a:t>12/02/2019</a:t>
+              <a:t>26/03/2019</a:t>
             </a:fld>
             <a:endParaRPr lang="en-GB" dirty="0"/>
           </a:p>
@@ -5511,7 +6018,7 @@
           <a:p>
             <a:fld id="{614C4262-CD6F-46A5-9B43-B159DA78181C}" type="datetimeFigureOut">
               <a:rPr lang="en-GB" smtClean="0"/>
-              <a:t>12/02/2019</a:t>
+              <a:t>26/03/2019</a:t>
             </a:fld>
             <a:endParaRPr lang="en-GB" dirty="0"/>
           </a:p>
@@ -5681,7 +6188,7 @@
           <a:p>
             <a:fld id="{614C4262-CD6F-46A5-9B43-B159DA78181C}" type="datetimeFigureOut">
               <a:rPr lang="en-GB" smtClean="0"/>
-              <a:t>12/02/2019</a:t>
+              <a:t>26/03/2019</a:t>
             </a:fld>
             <a:endParaRPr lang="en-GB" dirty="0"/>
           </a:p>
@@ -5927,7 +6434,7 @@
           <a:p>
             <a:fld id="{614C4262-CD6F-46A5-9B43-B159DA78181C}" type="datetimeFigureOut">
               <a:rPr lang="en-GB" smtClean="0"/>
-              <a:t>12/02/2019</a:t>
+              <a:t>26/03/2019</a:t>
             </a:fld>
             <a:endParaRPr lang="en-GB" dirty="0"/>
           </a:p>
@@ -6159,7 +6666,7 @@
           <a:p>
             <a:fld id="{614C4262-CD6F-46A5-9B43-B159DA78181C}" type="datetimeFigureOut">
               <a:rPr lang="en-GB" smtClean="0"/>
-              <a:t>12/02/2019</a:t>
+              <a:t>26/03/2019</a:t>
             </a:fld>
             <a:endParaRPr lang="en-GB" dirty="0"/>
           </a:p>
@@ -6526,7 +7033,7 @@
           <a:p>
             <a:fld id="{614C4262-CD6F-46A5-9B43-B159DA78181C}" type="datetimeFigureOut">
               <a:rPr lang="en-GB" smtClean="0"/>
-              <a:t>12/02/2019</a:t>
+              <a:t>26/03/2019</a:t>
             </a:fld>
             <a:endParaRPr lang="en-GB" dirty="0"/>
           </a:p>
@@ -6644,7 +7151,7 @@
           <a:p>
             <a:fld id="{614C4262-CD6F-46A5-9B43-B159DA78181C}" type="datetimeFigureOut">
               <a:rPr lang="en-GB" smtClean="0"/>
-              <a:t>12/02/2019</a:t>
+              <a:t>26/03/2019</a:t>
             </a:fld>
             <a:endParaRPr lang="en-GB" dirty="0"/>
           </a:p>
@@ -6739,7 +7246,7 @@
           <a:p>
             <a:fld id="{614C4262-CD6F-46A5-9B43-B159DA78181C}" type="datetimeFigureOut">
               <a:rPr lang="en-GB" smtClean="0"/>
-              <a:t>12/02/2019</a:t>
+              <a:t>26/03/2019</a:t>
             </a:fld>
             <a:endParaRPr lang="en-GB" dirty="0"/>
           </a:p>
@@ -7016,7 +7523,7 @@
           <a:p>
             <a:fld id="{614C4262-CD6F-46A5-9B43-B159DA78181C}" type="datetimeFigureOut">
               <a:rPr lang="en-GB" smtClean="0"/>
-              <a:t>12/02/2019</a:t>
+              <a:t>26/03/2019</a:t>
             </a:fld>
             <a:endParaRPr lang="en-GB" dirty="0"/>
           </a:p>
@@ -7269,7 +7776,7 @@
           <a:p>
             <a:fld id="{614C4262-CD6F-46A5-9B43-B159DA78181C}" type="datetimeFigureOut">
               <a:rPr lang="en-GB" smtClean="0"/>
-              <a:t>12/02/2019</a:t>
+              <a:t>26/03/2019</a:t>
             </a:fld>
             <a:endParaRPr lang="en-GB" dirty="0"/>
           </a:p>
@@ -7482,7 +7989,7 @@
           <a:p>
             <a:fld id="{614C4262-CD6F-46A5-9B43-B159DA78181C}" type="datetimeFigureOut">
               <a:rPr lang="en-GB" smtClean="0"/>
-              <a:t>12/02/2019</a:t>
+              <a:t>26/03/2019</a:t>
             </a:fld>
             <a:endParaRPr lang="en-GB" dirty="0"/>
           </a:p>
@@ -7894,14 +8401,14 @@
           <p:nvPr>
             <p:extLst>
               <p:ext uri="{D42A27DB-BD31-4B8C-83A1-F6EECF244321}">
-                <p14:modId xmlns:p14="http://schemas.microsoft.com/office/powerpoint/2010/main" val="4084016684"/>
+                <p14:modId xmlns:p14="http://schemas.microsoft.com/office/powerpoint/2010/main" val="2135427255"/>
               </p:ext>
             </p:extLst>
           </p:nvPr>
         </p:nvGraphicFramePr>
         <p:xfrm>
-          <a:off x="1807555" y="124692"/>
-          <a:ext cx="7635703" cy="6500552"/>
+          <a:off x="1807555" y="74815"/>
+          <a:ext cx="7677267" cy="6783185"/>
         </p:xfrm>
         <a:graphic>
           <a:graphicData uri="http://schemas.openxmlformats.org/drawingml/2006/diagram">

</xml_diff>